<commit_message>
Added rules to pre-first commit and post-first commit and added some ability to deal with permissions
Adding NEW AND TEMP stuff to front end.
</commit_message>
<xml_diff>
--- a/PartDesign/FinalOutput.pptx
+++ b/PartDesign/FinalOutput.pptx
@@ -104,6 +104,11 @@
       </a:defRPr>
     </a:lvl9pPr>
   </p:defaultTextStyle>
+  <p:extLst>
+    <p:ext uri="{EFAFB233-063F-42B5-8137-9DF3F51BA10A}">
+      <p15:sldGuideLst xmlns:p15="http://schemas.microsoft.com/office/powerpoint/2012/main"/>
+    </p:ext>
+  </p:extLst>
 </p:presentation>
 </file>
 
@@ -254,7 +259,7 @@
           <a:p>
             <a:fld id="{B7E8566A-16DC-45DC-A00B-231E3F207A93}" type="datetimeFigureOut">
               <a:rPr lang="en-US" smtClean="0"/>
-              <a:t>3/11/2021</a:t>
+              <a:t>4/26/2021</a:t>
             </a:fld>
             <a:endParaRPr lang="en-US"/>
           </a:p>
@@ -452,7 +457,7 @@
           <a:p>
             <a:fld id="{B7E8566A-16DC-45DC-A00B-231E3F207A93}" type="datetimeFigureOut">
               <a:rPr lang="en-US" smtClean="0"/>
-              <a:t>3/11/2021</a:t>
+              <a:t>4/26/2021</a:t>
             </a:fld>
             <a:endParaRPr lang="en-US"/>
           </a:p>
@@ -660,7 +665,7 @@
           <a:p>
             <a:fld id="{B7E8566A-16DC-45DC-A00B-231E3F207A93}" type="datetimeFigureOut">
               <a:rPr lang="en-US" smtClean="0"/>
-              <a:t>3/11/2021</a:t>
+              <a:t>4/26/2021</a:t>
             </a:fld>
             <a:endParaRPr lang="en-US"/>
           </a:p>
@@ -858,7 +863,7 @@
           <a:p>
             <a:fld id="{B7E8566A-16DC-45DC-A00B-231E3F207A93}" type="datetimeFigureOut">
               <a:rPr lang="en-US" smtClean="0"/>
-              <a:t>3/11/2021</a:t>
+              <a:t>4/26/2021</a:t>
             </a:fld>
             <a:endParaRPr lang="en-US"/>
           </a:p>
@@ -1133,7 +1138,7 @@
           <a:p>
             <a:fld id="{B7E8566A-16DC-45DC-A00B-231E3F207A93}" type="datetimeFigureOut">
               <a:rPr lang="en-US" smtClean="0"/>
-              <a:t>3/11/2021</a:t>
+              <a:t>4/26/2021</a:t>
             </a:fld>
             <a:endParaRPr lang="en-US"/>
           </a:p>
@@ -1398,7 +1403,7 @@
           <a:p>
             <a:fld id="{B7E8566A-16DC-45DC-A00B-231E3F207A93}" type="datetimeFigureOut">
               <a:rPr lang="en-US" smtClean="0"/>
-              <a:t>3/11/2021</a:t>
+              <a:t>4/26/2021</a:t>
             </a:fld>
             <a:endParaRPr lang="en-US"/>
           </a:p>
@@ -1810,7 +1815,7 @@
           <a:p>
             <a:fld id="{B7E8566A-16DC-45DC-A00B-231E3F207A93}" type="datetimeFigureOut">
               <a:rPr lang="en-US" smtClean="0"/>
-              <a:t>3/11/2021</a:t>
+              <a:t>4/26/2021</a:t>
             </a:fld>
             <a:endParaRPr lang="en-US"/>
           </a:p>
@@ -1951,7 +1956,7 @@
           <a:p>
             <a:fld id="{B7E8566A-16DC-45DC-A00B-231E3F207A93}" type="datetimeFigureOut">
               <a:rPr lang="en-US" smtClean="0"/>
-              <a:t>3/11/2021</a:t>
+              <a:t>4/26/2021</a:t>
             </a:fld>
             <a:endParaRPr lang="en-US"/>
           </a:p>
@@ -2064,7 +2069,7 @@
           <a:p>
             <a:fld id="{B7E8566A-16DC-45DC-A00B-231E3F207A93}" type="datetimeFigureOut">
               <a:rPr lang="en-US" smtClean="0"/>
-              <a:t>3/11/2021</a:t>
+              <a:t>4/26/2021</a:t>
             </a:fld>
             <a:endParaRPr lang="en-US"/>
           </a:p>
@@ -2375,7 +2380,7 @@
           <a:p>
             <a:fld id="{B7E8566A-16DC-45DC-A00B-231E3F207A93}" type="datetimeFigureOut">
               <a:rPr lang="en-US" smtClean="0"/>
-              <a:t>3/11/2021</a:t>
+              <a:t>4/26/2021</a:t>
             </a:fld>
             <a:endParaRPr lang="en-US"/>
           </a:p>
@@ -2663,7 +2668,7 @@
           <a:p>
             <a:fld id="{B7E8566A-16DC-45DC-A00B-231E3F207A93}" type="datetimeFigureOut">
               <a:rPr lang="en-US" smtClean="0"/>
-              <a:t>3/11/2021</a:t>
+              <a:t>4/26/2021</a:t>
             </a:fld>
             <a:endParaRPr lang="en-US"/>
           </a:p>
@@ -2904,7 +2909,7 @@
           <a:p>
             <a:fld id="{B7E8566A-16DC-45DC-A00B-231E3F207A93}" type="datetimeFigureOut">
               <a:rPr lang="en-US" smtClean="0"/>
-              <a:t>3/11/2021</a:t>
+              <a:t>4/26/2021</a:t>
             </a:fld>
             <a:endParaRPr lang="en-US"/>
           </a:p>
@@ -3370,7 +3375,10 @@
           <a:bodyPr/>
           <a:lstStyle/>
           <a:p>
-            <a:endParaRPr lang="en-US"/>
+            <a:r>
+              <a:rPr lang="en-US"/>
+              <a:t>sdf</a:t>
+            </a:r>
           </a:p>
         </p:txBody>
       </p:sp>

</xml_diff>